<commit_message>
complete NXT lesson 5
complete NXT lesson 5
</commit_message>
<xml_diff>
--- a/15lego/4 Touch.pptx
+++ b/15lego/4 Touch.pptx
@@ -125,7 +125,7 @@
   </p:defaultTextStyle>
   <p:extLst>
     <p:ext uri="{EFAFB233-063F-42B5-8137-9DF3F51BA10A}">
-      <p15:sldGuideLst xmlns:p15="http://schemas.microsoft.com/office/powerpoint/2012/main">
+      <p15:sldGuideLst xmlns:p15="http://schemas.microsoft.com/office/powerpoint/2012/main" xmlns="">
         <p15:guide id="1" orient="horz" pos="2160">
           <p15:clr>
             <a:srgbClr val="A4A3A4"/>
@@ -224,7 +224,8 @@
           <a:p>
             <a:fld id="{F8D9B3D7-15CB-9343-AA49-EFB5A8F33F18}" type="datetimeFigureOut">
               <a:rPr lang="en-US" smtClean="0"/>
-              <a:t>3/6/2019</a:t>
+              <a:pPr/>
+              <a:t>3/13/2019</a:t>
             </a:fld>
             <a:endParaRPr lang="en-US"/>
           </a:p>
@@ -290,6 +291,7 @@
           <a:p>
             <a:fld id="{6ED9BD6B-3536-BC44-B54A-7079C6CEB9D9}" type="slidenum">
               <a:rPr lang="en-US" smtClean="0"/>
+              <a:pPr/>
               <a:t>‹#›</a:t>
             </a:fld>
             <a:endParaRPr lang="en-US"/>
@@ -299,7 +301,7 @@
     </p:spTree>
     <p:extLst>
       <p:ext uri="{BB962C8B-B14F-4D97-AF65-F5344CB8AC3E}">
-        <p14:creationId xmlns:p14="http://schemas.microsoft.com/office/powerpoint/2010/main" val="3300303276"/>
+        <p14:creationId xmlns:p14="http://schemas.microsoft.com/office/powerpoint/2010/main" xmlns="" val="3300303276"/>
       </p:ext>
     </p:extLst>
   </p:cSld>
@@ -390,7 +392,8 @@
           <a:p>
             <a:fld id="{FD3EFF1E-85A1-6640-AFB9-C38833E80A84}" type="datetimeFigureOut">
               <a:rPr lang="en-US" smtClean="0"/>
-              <a:t>3/6/2019</a:t>
+              <a:pPr/>
+              <a:t>3/13/2019</a:t>
             </a:fld>
             <a:endParaRPr lang="en-US"/>
           </a:p>
@@ -549,6 +552,7 @@
           <a:p>
             <a:fld id="{13967457-1E83-1040-AFF7-8D09C473DBD5}" type="slidenum">
               <a:rPr lang="en-US" smtClean="0"/>
+              <a:pPr/>
               <a:t>‹#›</a:t>
             </a:fld>
             <a:endParaRPr lang="en-US"/>
@@ -558,7 +562,7 @@
     </p:spTree>
     <p:extLst>
       <p:ext uri="{BB962C8B-B14F-4D97-AF65-F5344CB8AC3E}">
-        <p14:creationId xmlns:p14="http://schemas.microsoft.com/office/powerpoint/2010/main" val="2489184269"/>
+        <p14:creationId xmlns:p14="http://schemas.microsoft.com/office/powerpoint/2010/main" xmlns="" val="2489184269"/>
       </p:ext>
     </p:extLst>
   </p:cSld>
@@ -724,6 +728,7 @@
           <a:p>
             <a:fld id="{13967457-1E83-1040-AFF7-8D09C473DBD5}" type="slidenum">
               <a:rPr lang="en-US" smtClean="0"/>
+              <a:pPr/>
               <a:t>3</a:t>
             </a:fld>
             <a:endParaRPr lang="en-US"/>
@@ -733,7 +738,7 @@
     </p:spTree>
     <p:extLst>
       <p:ext uri="{BB962C8B-B14F-4D97-AF65-F5344CB8AC3E}">
-        <p14:creationId xmlns:p14="http://schemas.microsoft.com/office/powerpoint/2010/main" val="2783415167"/>
+        <p14:creationId xmlns:p14="http://schemas.microsoft.com/office/powerpoint/2010/main" xmlns="" val="2783415167"/>
       </p:ext>
     </p:extLst>
   </p:cSld>
@@ -808,6 +813,7 @@
           <a:p>
             <a:fld id="{13967457-1E83-1040-AFF7-8D09C473DBD5}" type="slidenum">
               <a:rPr lang="en-US" smtClean="0"/>
+              <a:pPr/>
               <a:t>10</a:t>
             </a:fld>
             <a:endParaRPr lang="en-US"/>
@@ -817,7 +823,7 @@
     </p:spTree>
     <p:extLst>
       <p:ext uri="{BB962C8B-B14F-4D97-AF65-F5344CB8AC3E}">
-        <p14:creationId xmlns:p14="http://schemas.microsoft.com/office/powerpoint/2010/main" val="1137836655"/>
+        <p14:creationId xmlns:p14="http://schemas.microsoft.com/office/powerpoint/2010/main" xmlns="" val="1137836655"/>
       </p:ext>
     </p:extLst>
   </p:cSld>
@@ -892,6 +898,7 @@
           <a:p>
             <a:fld id="{13967457-1E83-1040-AFF7-8D09C473DBD5}" type="slidenum">
               <a:rPr lang="en-US" smtClean="0"/>
+              <a:pPr/>
               <a:t>12</a:t>
             </a:fld>
             <a:endParaRPr lang="en-US"/>
@@ -901,7 +908,7 @@
     </p:spTree>
     <p:extLst>
       <p:ext uri="{BB962C8B-B14F-4D97-AF65-F5344CB8AC3E}">
-        <p14:creationId xmlns:p14="http://schemas.microsoft.com/office/powerpoint/2010/main" val="1007852627"/>
+        <p14:creationId xmlns:p14="http://schemas.microsoft.com/office/powerpoint/2010/main" xmlns="" val="1007852627"/>
       </p:ext>
     </p:extLst>
   </p:cSld>
@@ -1063,7 +1070,8 @@
           <a:p>
             <a:fld id="{734D3379-CDE8-564F-A32A-D111D2B5DEDF}" type="datetime1">
               <a:rPr lang="en-US" smtClean="0"/>
-              <a:t>3/6/2019</a:t>
+              <a:pPr/>
+              <a:t>3/13/2019</a:t>
             </a:fld>
             <a:endParaRPr lang="en-US"/>
           </a:p>
@@ -1130,6 +1138,7 @@
           <a:p>
             <a:fld id="{4DBC7FC8-25FB-FC45-8177-2B991DA6778C}" type="slidenum">
               <a:rPr lang="en-US" smtClean="0"/>
+              <a:pPr/>
               <a:t>‹#›</a:t>
             </a:fld>
             <a:endParaRPr lang="en-US"/>
@@ -1262,7 +1271,7 @@
           <a:blip r:embed="rId2">
             <a:extLst>
               <a:ext uri="{28A0092B-C50C-407E-A947-70E740481C1C}">
-                <a14:useLocalDpi xmlns:a14="http://schemas.microsoft.com/office/drawing/2010/main"/>
+                <a14:useLocalDpi xmlns:a14="http://schemas.microsoft.com/office/drawing/2010/main" xmlns=""/>
               </a:ext>
             </a:extLst>
           </a:blip>
@@ -1282,7 +1291,7 @@
           <a:noFill/>
           <a:extLst>
             <a:ext uri="{909E8E84-426E-40dd-AFC4-6F175D3DCCD1}">
-              <a14:hiddenFill xmlns="" xmlns:a14="http://schemas.microsoft.com/office/drawing/2010/main">
+              <a14:hiddenFill xmlns:a14="http://schemas.microsoft.com/office/drawing/2010/main" xmlns="">
                 <a:solidFill>
                   <a:srgbClr val="FFFFFF"/>
                 </a:solidFill>
@@ -1478,7 +1487,7 @@
     </p:spTree>
     <p:extLst>
       <p:ext uri="{BB962C8B-B14F-4D97-AF65-F5344CB8AC3E}">
-        <p14:creationId xmlns:p14="http://schemas.microsoft.com/office/powerpoint/2010/main" val="1731270372"/>
+        <p14:creationId xmlns:p14="http://schemas.microsoft.com/office/powerpoint/2010/main" xmlns="" val="1731270372"/>
       </p:ext>
     </p:extLst>
   </p:cSld>
@@ -1604,7 +1613,8 @@
           <a:p>
             <a:fld id="{037E39DB-0282-2D43-A88B-5F84187E61CB}" type="datetime1">
               <a:rPr lang="en-US" smtClean="0"/>
-              <a:t>3/6/2019</a:t>
+              <a:pPr/>
+              <a:t>3/13/2019</a:t>
             </a:fld>
             <a:endParaRPr lang="en-US"/>
           </a:p>
@@ -1658,6 +1668,7 @@
           <a:p>
             <a:fld id="{4DBC7FC8-25FB-FC45-8177-2B991DA6778C}" type="slidenum">
               <a:rPr lang="en-US" smtClean="0"/>
+              <a:pPr/>
               <a:t>‹#›</a:t>
             </a:fld>
             <a:endParaRPr lang="en-US"/>
@@ -1667,7 +1678,7 @@
     </p:spTree>
     <p:extLst>
       <p:ext uri="{BB962C8B-B14F-4D97-AF65-F5344CB8AC3E}">
-        <p14:creationId xmlns:p14="http://schemas.microsoft.com/office/powerpoint/2010/main" val="496099929"/>
+        <p14:creationId xmlns:p14="http://schemas.microsoft.com/office/powerpoint/2010/main" xmlns="" val="496099929"/>
       </p:ext>
     </p:extLst>
   </p:cSld>
@@ -1796,7 +1807,8 @@
           <a:p>
             <a:fld id="{468433E0-C5EC-BE4E-AAE9-D56E452479DD}" type="datetime1">
               <a:rPr lang="en-US" smtClean="0"/>
-              <a:t>3/6/2019</a:t>
+              <a:pPr/>
+              <a:t>3/13/2019</a:t>
             </a:fld>
             <a:endParaRPr lang="en-US"/>
           </a:p>
@@ -1850,6 +1862,7 @@
           <a:p>
             <a:fld id="{4DBC7FC8-25FB-FC45-8177-2B991DA6778C}" type="slidenum">
               <a:rPr lang="en-US" smtClean="0"/>
+              <a:pPr/>
               <a:t>‹#›</a:t>
             </a:fld>
             <a:endParaRPr lang="en-US"/>
@@ -1859,7 +1872,7 @@
     </p:spTree>
     <p:extLst>
       <p:ext uri="{BB962C8B-B14F-4D97-AF65-F5344CB8AC3E}">
-        <p14:creationId xmlns:p14="http://schemas.microsoft.com/office/powerpoint/2010/main" val="1419989049"/>
+        <p14:creationId xmlns:p14="http://schemas.microsoft.com/office/powerpoint/2010/main" xmlns="" val="1419989049"/>
       </p:ext>
     </p:extLst>
   </p:cSld>
@@ -2000,7 +2013,8 @@
           <a:p>
             <a:fld id="{6BC9F42C-B4E1-5841-9147-5DFD4C8BD9AC}" type="datetime1">
               <a:rPr lang="en-US" smtClean="0"/>
-              <a:t>3/6/2019</a:t>
+              <a:pPr/>
+              <a:t>3/13/2019</a:t>
             </a:fld>
             <a:endParaRPr lang="en-US"/>
           </a:p>
@@ -2046,6 +2060,7 @@
           <a:p>
             <a:fld id="{DE42E464-3EB8-43C8-8768-9E2AD4F497B7}" type="slidenum">
               <a:rPr lang="en-US" smtClean="0"/>
+              <a:pPr/>
               <a:t>‹#›</a:t>
             </a:fld>
             <a:endParaRPr lang="en-US"/>
@@ -2055,7 +2070,7 @@
     </p:spTree>
     <p:extLst>
       <p:ext uri="{BB962C8B-B14F-4D97-AF65-F5344CB8AC3E}">
-        <p14:creationId xmlns:p14="http://schemas.microsoft.com/office/powerpoint/2010/main" val="1488159155"/>
+        <p14:creationId xmlns:p14="http://schemas.microsoft.com/office/powerpoint/2010/main" xmlns="" val="1488159155"/>
       </p:ext>
     </p:extLst>
   </p:cSld>
@@ -2174,7 +2189,8 @@
           <a:p>
             <a:fld id="{B1F855B8-4A35-2F4B-9BE5-A9E032A37919}" type="datetime1">
               <a:rPr lang="en-US" smtClean="0"/>
-              <a:t>3/6/2019</a:t>
+              <a:pPr/>
+              <a:t>3/13/2019</a:t>
             </a:fld>
             <a:endParaRPr lang="en-US"/>
           </a:p>
@@ -2220,6 +2236,7 @@
           <a:p>
             <a:fld id="{DE42E464-3EB8-43C8-8768-9E2AD4F497B7}" type="slidenum">
               <a:rPr lang="en-US" smtClean="0"/>
+              <a:pPr/>
               <a:t>‹#›</a:t>
             </a:fld>
             <a:endParaRPr lang="en-US"/>
@@ -2229,7 +2246,7 @@
     </p:spTree>
     <p:extLst>
       <p:ext uri="{BB962C8B-B14F-4D97-AF65-F5344CB8AC3E}">
-        <p14:creationId xmlns:p14="http://schemas.microsoft.com/office/powerpoint/2010/main" val="1896365123"/>
+        <p14:creationId xmlns:p14="http://schemas.microsoft.com/office/powerpoint/2010/main" xmlns="" val="1896365123"/>
       </p:ext>
     </p:extLst>
   </p:cSld>
@@ -2424,7 +2441,8 @@
           <a:p>
             <a:fld id="{76AF6D96-B6B6-9F46-8145-E884FC689B52}" type="datetime1">
               <a:rPr lang="en-US" smtClean="0"/>
-              <a:t>3/6/2019</a:t>
+              <a:pPr/>
+              <a:t>3/13/2019</a:t>
             </a:fld>
             <a:endParaRPr lang="en-US"/>
           </a:p>
@@ -2470,6 +2488,7 @@
           <a:p>
             <a:fld id="{DE42E464-3EB8-43C8-8768-9E2AD4F497B7}" type="slidenum">
               <a:rPr lang="en-US" smtClean="0"/>
+              <a:pPr/>
               <a:t>‹#›</a:t>
             </a:fld>
             <a:endParaRPr lang="en-US"/>
@@ -2479,7 +2498,7 @@
     </p:spTree>
     <p:extLst>
       <p:ext uri="{BB962C8B-B14F-4D97-AF65-F5344CB8AC3E}">
-        <p14:creationId xmlns:p14="http://schemas.microsoft.com/office/powerpoint/2010/main" val="1403817134"/>
+        <p14:creationId xmlns:p14="http://schemas.microsoft.com/office/powerpoint/2010/main" xmlns="" val="1403817134"/>
       </p:ext>
     </p:extLst>
   </p:cSld>
@@ -2660,7 +2679,8 @@
           <a:p>
             <a:fld id="{151C8181-6EF9-BB46-881E-49425AE4A1D6}" type="datetime1">
               <a:rPr lang="en-US" smtClean="0"/>
-              <a:t>3/6/2019</a:t>
+              <a:pPr/>
+              <a:t>3/13/2019</a:t>
             </a:fld>
             <a:endParaRPr lang="en-US"/>
           </a:p>
@@ -2706,6 +2726,7 @@
           <a:p>
             <a:fld id="{DE42E464-3EB8-43C8-8768-9E2AD4F497B7}" type="slidenum">
               <a:rPr lang="en-US" smtClean="0"/>
+              <a:pPr/>
               <a:t>‹#›</a:t>
             </a:fld>
             <a:endParaRPr lang="en-US"/>
@@ -2715,7 +2736,7 @@
     </p:spTree>
     <p:extLst>
       <p:ext uri="{BB962C8B-B14F-4D97-AF65-F5344CB8AC3E}">
-        <p14:creationId xmlns:p14="http://schemas.microsoft.com/office/powerpoint/2010/main" val="1699225196"/>
+        <p14:creationId xmlns:p14="http://schemas.microsoft.com/office/powerpoint/2010/main" xmlns="" val="1699225196"/>
       </p:ext>
     </p:extLst>
   </p:cSld>
@@ -3031,7 +3052,8 @@
           <a:p>
             <a:fld id="{3FE9FB58-9E1D-8C4A-B30B-612CD10181F2}" type="datetime1">
               <a:rPr lang="en-US" smtClean="0"/>
-              <a:t>3/6/2019</a:t>
+              <a:pPr/>
+              <a:t>3/13/2019</a:t>
             </a:fld>
             <a:endParaRPr lang="en-US"/>
           </a:p>
@@ -3077,6 +3099,7 @@
           <a:p>
             <a:fld id="{DE42E464-3EB8-43C8-8768-9E2AD4F497B7}" type="slidenum">
               <a:rPr lang="en-US" smtClean="0"/>
+              <a:pPr/>
               <a:t>‹#›</a:t>
             </a:fld>
             <a:endParaRPr lang="en-US"/>
@@ -3086,7 +3109,7 @@
     </p:spTree>
     <p:extLst>
       <p:ext uri="{BB962C8B-B14F-4D97-AF65-F5344CB8AC3E}">
-        <p14:creationId xmlns:p14="http://schemas.microsoft.com/office/powerpoint/2010/main" val="1640331366"/>
+        <p14:creationId xmlns:p14="http://schemas.microsoft.com/office/powerpoint/2010/main" xmlns="" val="1640331366"/>
       </p:ext>
     </p:extLst>
   </p:cSld>
@@ -3153,7 +3176,8 @@
           <a:p>
             <a:fld id="{B99A1D06-D031-574C-B314-3D3A913D09A7}" type="datetime1">
               <a:rPr lang="en-US" smtClean="0"/>
-              <a:t>3/6/2019</a:t>
+              <a:pPr/>
+              <a:t>3/13/2019</a:t>
             </a:fld>
             <a:endParaRPr lang="en-US"/>
           </a:p>
@@ -3199,6 +3223,7 @@
           <a:p>
             <a:fld id="{DE42E464-3EB8-43C8-8768-9E2AD4F497B7}" type="slidenum">
               <a:rPr lang="en-US" smtClean="0"/>
+              <a:pPr/>
               <a:t>‹#›</a:t>
             </a:fld>
             <a:endParaRPr lang="en-US"/>
@@ -3208,7 +3233,7 @@
     </p:spTree>
     <p:extLst>
       <p:ext uri="{BB962C8B-B14F-4D97-AF65-F5344CB8AC3E}">
-        <p14:creationId xmlns:p14="http://schemas.microsoft.com/office/powerpoint/2010/main" val="1801691823"/>
+        <p14:creationId xmlns:p14="http://schemas.microsoft.com/office/powerpoint/2010/main" xmlns="" val="1801691823"/>
       </p:ext>
     </p:extLst>
   </p:cSld>
@@ -3252,7 +3277,8 @@
           <a:p>
             <a:fld id="{48908501-297D-E04E-8371-D2DC10164BF0}" type="datetime1">
               <a:rPr lang="en-US" smtClean="0"/>
-              <a:t>3/6/2019</a:t>
+              <a:pPr/>
+              <a:t>3/13/2019</a:t>
             </a:fld>
             <a:endParaRPr lang="en-US"/>
           </a:p>
@@ -3298,6 +3324,7 @@
           <a:p>
             <a:fld id="{DE42E464-3EB8-43C8-8768-9E2AD4F497B7}" type="slidenum">
               <a:rPr lang="en-US" smtClean="0"/>
+              <a:pPr/>
               <a:t>‹#›</a:t>
             </a:fld>
             <a:endParaRPr lang="en-US"/>
@@ -3307,7 +3334,7 @@
     </p:spTree>
     <p:extLst>
       <p:ext uri="{BB962C8B-B14F-4D97-AF65-F5344CB8AC3E}">
-        <p14:creationId xmlns:p14="http://schemas.microsoft.com/office/powerpoint/2010/main" val="1515046461"/>
+        <p14:creationId xmlns:p14="http://schemas.microsoft.com/office/powerpoint/2010/main" xmlns="" val="1515046461"/>
       </p:ext>
     </p:extLst>
   </p:cSld>
@@ -3533,7 +3560,8 @@
           <a:p>
             <a:fld id="{85B90354-FE89-EB42-A40C-D608C6421438}" type="datetime1">
               <a:rPr lang="en-US" smtClean="0"/>
-              <a:t>3/6/2019</a:t>
+              <a:pPr/>
+              <a:t>3/13/2019</a:t>
             </a:fld>
             <a:endParaRPr lang="en-US"/>
           </a:p>
@@ -3579,6 +3607,7 @@
           <a:p>
             <a:fld id="{DE42E464-3EB8-43C8-8768-9E2AD4F497B7}" type="slidenum">
               <a:rPr lang="en-US" smtClean="0"/>
+              <a:pPr/>
               <a:t>‹#›</a:t>
             </a:fld>
             <a:endParaRPr lang="en-US"/>
@@ -3588,7 +3617,7 @@
     </p:spTree>
     <p:extLst>
       <p:ext uri="{BB962C8B-B14F-4D97-AF65-F5344CB8AC3E}">
-        <p14:creationId xmlns:p14="http://schemas.microsoft.com/office/powerpoint/2010/main" val="672267548"/>
+        <p14:creationId xmlns:p14="http://schemas.microsoft.com/office/powerpoint/2010/main" xmlns="" val="672267548"/>
       </p:ext>
     </p:extLst>
   </p:cSld>
@@ -3717,7 +3746,8 @@
           <a:p>
             <a:fld id="{B65FA35E-C1E6-2F43-8D1F-8D1A0506DE17}" type="datetime1">
               <a:rPr lang="en-US" smtClean="0"/>
-              <a:t>3/6/2019</a:t>
+              <a:pPr/>
+              <a:t>3/13/2019</a:t>
             </a:fld>
             <a:endParaRPr lang="en-US"/>
           </a:p>
@@ -3771,6 +3801,7 @@
           <a:p>
             <a:fld id="{4DBC7FC8-25FB-FC45-8177-2B991DA6778C}" type="slidenum">
               <a:rPr lang="en-US" smtClean="0"/>
+              <a:pPr/>
               <a:t>‹#›</a:t>
             </a:fld>
             <a:endParaRPr lang="en-US"/>
@@ -3780,7 +3811,7 @@
     </p:spTree>
     <p:extLst>
       <p:ext uri="{BB962C8B-B14F-4D97-AF65-F5344CB8AC3E}">
-        <p14:creationId xmlns:p14="http://schemas.microsoft.com/office/powerpoint/2010/main" val="1205209001"/>
+        <p14:creationId xmlns:p14="http://schemas.microsoft.com/office/powerpoint/2010/main" xmlns="" val="1205209001"/>
       </p:ext>
     </p:extLst>
   </p:cSld>
@@ -3993,7 +4024,8 @@
           <a:p>
             <a:fld id="{4325E002-C9C3-8B41-BCCA-4C3D472D296D}" type="datetime1">
               <a:rPr lang="en-US" smtClean="0"/>
-              <a:t>3/6/2019</a:t>
+              <a:pPr/>
+              <a:t>3/13/2019</a:t>
             </a:fld>
             <a:endParaRPr lang="en-US"/>
           </a:p>
@@ -4039,6 +4071,7 @@
           <a:p>
             <a:fld id="{DE42E464-3EB8-43C8-8768-9E2AD4F497B7}" type="slidenum">
               <a:rPr lang="en-US" smtClean="0"/>
+              <a:pPr/>
               <a:t>‹#›</a:t>
             </a:fld>
             <a:endParaRPr lang="en-US"/>
@@ -4048,7 +4081,7 @@
     </p:spTree>
     <p:extLst>
       <p:ext uri="{BB962C8B-B14F-4D97-AF65-F5344CB8AC3E}">
-        <p14:creationId xmlns:p14="http://schemas.microsoft.com/office/powerpoint/2010/main" val="889212369"/>
+        <p14:creationId xmlns:p14="http://schemas.microsoft.com/office/powerpoint/2010/main" xmlns="" val="889212369"/>
       </p:ext>
     </p:extLst>
   </p:cSld>
@@ -4167,7 +4200,8 @@
           <a:p>
             <a:fld id="{F0804892-FDBA-334B-B903-5C82D96F601B}" type="datetime1">
               <a:rPr lang="en-US" smtClean="0"/>
-              <a:t>3/6/2019</a:t>
+              <a:pPr/>
+              <a:t>3/13/2019</a:t>
             </a:fld>
             <a:endParaRPr lang="en-US"/>
           </a:p>
@@ -4213,6 +4247,7 @@
           <a:p>
             <a:fld id="{DE42E464-3EB8-43C8-8768-9E2AD4F497B7}" type="slidenum">
               <a:rPr lang="en-US" smtClean="0"/>
+              <a:pPr/>
               <a:t>‹#›</a:t>
             </a:fld>
             <a:endParaRPr lang="en-US"/>
@@ -4222,7 +4257,7 @@
     </p:spTree>
     <p:extLst>
       <p:ext uri="{BB962C8B-B14F-4D97-AF65-F5344CB8AC3E}">
-        <p14:creationId xmlns:p14="http://schemas.microsoft.com/office/powerpoint/2010/main" val="653586310"/>
+        <p14:creationId xmlns:p14="http://schemas.microsoft.com/office/powerpoint/2010/main" xmlns="" val="653586310"/>
       </p:ext>
     </p:extLst>
   </p:cSld>
@@ -4351,7 +4386,8 @@
           <a:p>
             <a:fld id="{BA4782C5-10F4-024F-B461-568BB589AC83}" type="datetime1">
               <a:rPr lang="en-US" smtClean="0"/>
-              <a:t>3/6/2019</a:t>
+              <a:pPr/>
+              <a:t>3/13/2019</a:t>
             </a:fld>
             <a:endParaRPr lang="en-US"/>
           </a:p>
@@ -4397,6 +4433,7 @@
           <a:p>
             <a:fld id="{DE42E464-3EB8-43C8-8768-9E2AD4F497B7}" type="slidenum">
               <a:rPr lang="en-US" smtClean="0"/>
+              <a:pPr/>
               <a:t>‹#›</a:t>
             </a:fld>
             <a:endParaRPr lang="en-US"/>
@@ -4406,7 +4443,7 @@
     </p:spTree>
     <p:extLst>
       <p:ext uri="{BB962C8B-B14F-4D97-AF65-F5344CB8AC3E}">
-        <p14:creationId xmlns:p14="http://schemas.microsoft.com/office/powerpoint/2010/main" val="446257765"/>
+        <p14:creationId xmlns:p14="http://schemas.microsoft.com/office/powerpoint/2010/main" xmlns="" val="446257765"/>
       </p:ext>
     </p:extLst>
   </p:cSld>
@@ -4609,7 +4646,8 @@
           <a:p>
             <a:fld id="{4759C3B7-D02A-A04B-90C6-1ABC246C483D}" type="datetime1">
               <a:rPr lang="en-US" smtClean="0"/>
-              <a:t>3/6/2019</a:t>
+              <a:pPr/>
+              <a:t>3/13/2019</a:t>
             </a:fld>
             <a:endParaRPr lang="en-US"/>
           </a:p>
@@ -4640,6 +4678,7 @@
           <a:p>
             <a:fld id="{4DBC7FC8-25FB-FC45-8177-2B991DA6778C}" type="slidenum">
               <a:rPr lang="en-US" smtClean="0"/>
+              <a:pPr/>
               <a:t>‹#›</a:t>
             </a:fld>
             <a:endParaRPr lang="en-US"/>
@@ -4672,7 +4711,7 @@
     </p:spTree>
     <p:extLst>
       <p:ext uri="{BB962C8B-B14F-4D97-AF65-F5344CB8AC3E}">
-        <p14:creationId xmlns:p14="http://schemas.microsoft.com/office/powerpoint/2010/main" val="881921303"/>
+        <p14:creationId xmlns:p14="http://schemas.microsoft.com/office/powerpoint/2010/main" xmlns="" val="881921303"/>
       </p:ext>
     </p:extLst>
   </p:cSld>
@@ -4914,7 +4953,8 @@
           <a:p>
             <a:fld id="{AA7DBEF8-8D86-144F-A470-7B3703EFCEC9}" type="datetime1">
               <a:rPr lang="en-US" smtClean="0"/>
-              <a:t>3/6/2019</a:t>
+              <a:pPr/>
+              <a:t>3/13/2019</a:t>
             </a:fld>
             <a:endParaRPr lang="en-US"/>
           </a:p>
@@ -4968,6 +5008,7 @@
           <a:p>
             <a:fld id="{4DBC7FC8-25FB-FC45-8177-2B991DA6778C}" type="slidenum">
               <a:rPr lang="en-US" smtClean="0"/>
+              <a:pPr/>
               <a:t>‹#›</a:t>
             </a:fld>
             <a:endParaRPr lang="en-US"/>
@@ -4977,7 +5018,7 @@
     </p:spTree>
     <p:extLst>
       <p:ext uri="{BB962C8B-B14F-4D97-AF65-F5344CB8AC3E}">
-        <p14:creationId xmlns:p14="http://schemas.microsoft.com/office/powerpoint/2010/main" val="519207927"/>
+        <p14:creationId xmlns:p14="http://schemas.microsoft.com/office/powerpoint/2010/main" xmlns="" val="519207927"/>
       </p:ext>
     </p:extLst>
   </p:cSld>
@@ -5377,7 +5418,8 @@
           <a:p>
             <a:fld id="{88842D03-A66B-894C-99E9-CCC3E8C15D2F}" type="datetime1">
               <a:rPr lang="en-US" smtClean="0"/>
-              <a:t>3/6/2019</a:t>
+              <a:pPr/>
+              <a:t>3/13/2019</a:t>
             </a:fld>
             <a:endParaRPr lang="en-US"/>
           </a:p>
@@ -5431,6 +5473,7 @@
           <a:p>
             <a:fld id="{4DBC7FC8-25FB-FC45-8177-2B991DA6778C}" type="slidenum">
               <a:rPr lang="en-US" smtClean="0"/>
+              <a:pPr/>
               <a:t>‹#›</a:t>
             </a:fld>
             <a:endParaRPr lang="en-US"/>
@@ -5440,7 +5483,7 @@
     </p:spTree>
     <p:extLst>
       <p:ext uri="{BB962C8B-B14F-4D97-AF65-F5344CB8AC3E}">
-        <p14:creationId xmlns:p14="http://schemas.microsoft.com/office/powerpoint/2010/main" val="1101571328"/>
+        <p14:creationId xmlns:p14="http://schemas.microsoft.com/office/powerpoint/2010/main" xmlns="" val="1101571328"/>
       </p:ext>
     </p:extLst>
   </p:cSld>
@@ -5514,7 +5557,8 @@
           <a:p>
             <a:fld id="{47FE3EF3-9D1A-AB4B-A2CC-56F2A1F031E5}" type="datetime1">
               <a:rPr lang="en-US" smtClean="0"/>
-              <a:t>3/6/2019</a:t>
+              <a:pPr/>
+              <a:t>3/13/2019</a:t>
             </a:fld>
             <a:endParaRPr lang="en-US"/>
           </a:p>
@@ -5568,6 +5612,7 @@
           <a:p>
             <a:fld id="{4DBC7FC8-25FB-FC45-8177-2B991DA6778C}" type="slidenum">
               <a:rPr lang="en-US" smtClean="0"/>
+              <a:pPr/>
               <a:t>‹#›</a:t>
             </a:fld>
             <a:endParaRPr lang="en-US"/>
@@ -5577,7 +5622,7 @@
     </p:spTree>
     <p:extLst>
       <p:ext uri="{BB962C8B-B14F-4D97-AF65-F5344CB8AC3E}">
-        <p14:creationId xmlns:p14="http://schemas.microsoft.com/office/powerpoint/2010/main" val="652788909"/>
+        <p14:creationId xmlns:p14="http://schemas.microsoft.com/office/powerpoint/2010/main" xmlns="" val="652788909"/>
       </p:ext>
     </p:extLst>
   </p:cSld>
@@ -5628,7 +5673,8 @@
           <a:p>
             <a:fld id="{038DEB34-34E0-ED47-A72E-77439100E0C1}" type="datetime1">
               <a:rPr lang="en-US" smtClean="0"/>
-              <a:t>3/6/2019</a:t>
+              <a:pPr/>
+              <a:t>3/13/2019</a:t>
             </a:fld>
             <a:endParaRPr lang="en-US"/>
           </a:p>
@@ -5682,6 +5728,7 @@
           <a:p>
             <a:fld id="{4DBC7FC8-25FB-FC45-8177-2B991DA6778C}" type="slidenum">
               <a:rPr lang="en-US" smtClean="0"/>
+              <a:pPr/>
               <a:t>‹#›</a:t>
             </a:fld>
             <a:endParaRPr lang="en-US"/>
@@ -5691,7 +5738,7 @@
     </p:spTree>
     <p:extLst>
       <p:ext uri="{BB962C8B-B14F-4D97-AF65-F5344CB8AC3E}">
-        <p14:creationId xmlns:p14="http://schemas.microsoft.com/office/powerpoint/2010/main" val="2076724687"/>
+        <p14:creationId xmlns:p14="http://schemas.microsoft.com/office/powerpoint/2010/main" xmlns="" val="2076724687"/>
       </p:ext>
     </p:extLst>
   </p:cSld>
@@ -5887,7 +5934,8 @@
           <a:p>
             <a:fld id="{4458F122-2B3D-7B4C-AB84-64E5124E11F9}" type="datetime1">
               <a:rPr lang="en-US" smtClean="0"/>
-              <a:t>3/6/2019</a:t>
+              <a:pPr/>
+              <a:t>3/13/2019</a:t>
             </a:fld>
             <a:endParaRPr lang="en-US"/>
           </a:p>
@@ -5941,6 +5989,7 @@
           <a:p>
             <a:fld id="{4DBC7FC8-25FB-FC45-8177-2B991DA6778C}" type="slidenum">
               <a:rPr lang="en-US" smtClean="0"/>
+              <a:pPr/>
               <a:t>‹#›</a:t>
             </a:fld>
             <a:endParaRPr lang="en-US"/>
@@ -5973,7 +6022,7 @@
     </p:spTree>
     <p:extLst>
       <p:ext uri="{BB962C8B-B14F-4D97-AF65-F5344CB8AC3E}">
-        <p14:creationId xmlns:p14="http://schemas.microsoft.com/office/powerpoint/2010/main" val="460099718"/>
+        <p14:creationId xmlns:p14="http://schemas.microsoft.com/office/powerpoint/2010/main" xmlns="" val="460099718"/>
       </p:ext>
     </p:extLst>
   </p:cSld>
@@ -6198,7 +6247,8 @@
           <a:p>
             <a:fld id="{F3822BCC-C4CA-584C-B495-6C2009ADC7DF}" type="datetime1">
               <a:rPr lang="en-US" smtClean="0"/>
-              <a:t>3/6/2019</a:t>
+              <a:pPr/>
+              <a:t>3/13/2019</a:t>
             </a:fld>
             <a:endParaRPr lang="en-US"/>
           </a:p>
@@ -6260,6 +6310,7 @@
           <a:p>
             <a:fld id="{4DBC7FC8-25FB-FC45-8177-2B991DA6778C}" type="slidenum">
               <a:rPr lang="en-US" smtClean="0"/>
+              <a:pPr/>
               <a:t>‹#›</a:t>
             </a:fld>
             <a:endParaRPr lang="en-US"/>
@@ -6349,7 +6400,7 @@
     </p:spTree>
     <p:extLst>
       <p:ext uri="{BB962C8B-B14F-4D97-AF65-F5344CB8AC3E}">
-        <p14:creationId xmlns:p14="http://schemas.microsoft.com/office/powerpoint/2010/main" val="1954831226"/>
+        <p14:creationId xmlns:p14="http://schemas.microsoft.com/office/powerpoint/2010/main" xmlns="" val="1954831226"/>
       </p:ext>
     </p:extLst>
   </p:cSld>
@@ -6509,7 +6560,8 @@
           <a:p>
             <a:fld id="{66CF60A4-F499-2743-ACBB-982E5F01925A}" type="datetime1">
               <a:rPr lang="en-US" smtClean="0"/>
-              <a:t>3/6/2019</a:t>
+              <a:pPr/>
+              <a:t>3/13/2019</a:t>
             </a:fld>
             <a:endParaRPr lang="en-US"/>
           </a:p>
@@ -6579,6 +6631,7 @@
           <a:p>
             <a:fld id="{4DBC7FC8-25FB-FC45-8177-2B991DA6778C}" type="slidenum">
               <a:rPr lang="en-US" smtClean="0"/>
+              <a:pPr/>
               <a:t>‹#›</a:t>
             </a:fld>
             <a:endParaRPr lang="en-US"/>
@@ -6816,7 +6869,7 @@
     </p:spTree>
     <p:extLst>
       <p:ext uri="{BB962C8B-B14F-4D97-AF65-F5344CB8AC3E}">
-        <p14:creationId xmlns:p14="http://schemas.microsoft.com/office/powerpoint/2010/main" val="962618289"/>
+        <p14:creationId xmlns:p14="http://schemas.microsoft.com/office/powerpoint/2010/main" xmlns="" val="962618289"/>
       </p:ext>
     </p:extLst>
   </p:cSld>
@@ -7274,7 +7327,8 @@
           <a:p>
             <a:fld id="{D757437D-136E-7246-8394-8265CCC540D4}" type="datetime1">
               <a:rPr lang="en-US" smtClean="0"/>
-              <a:t>3/6/2019</a:t>
+              <a:pPr/>
+              <a:t>3/13/2019</a:t>
             </a:fld>
             <a:endParaRPr lang="en-US"/>
           </a:p>
@@ -7356,6 +7410,7 @@
           <a:p>
             <a:fld id="{DE42E464-3EB8-43C8-8768-9E2AD4F497B7}" type="slidenum">
               <a:rPr lang="en-US" smtClean="0"/>
+              <a:pPr/>
               <a:t>‹#›</a:t>
             </a:fld>
             <a:endParaRPr lang="en-US"/>
@@ -7365,7 +7420,7 @@
     </p:spTree>
     <p:extLst>
       <p:ext uri="{BB962C8B-B14F-4D97-AF65-F5344CB8AC3E}">
-        <p14:creationId xmlns:p14="http://schemas.microsoft.com/office/powerpoint/2010/main" val="770177432"/>
+        <p14:creationId xmlns:p14="http://schemas.microsoft.com/office/powerpoint/2010/main" xmlns="" val="770177432"/>
       </p:ext>
     </p:extLst>
   </p:cSld>
@@ -7743,7 +7798,7 @@
           <a:blip r:embed="rId2">
             <a:extLst>
               <a:ext uri="{28A0092B-C50C-407E-A947-70E740481C1C}">
-                <a14:useLocalDpi xmlns:a14="http://schemas.microsoft.com/office/drawing/2010/main" val="0"/>
+                <a14:useLocalDpi xmlns:a14="http://schemas.microsoft.com/office/drawing/2010/main" xmlns="" val="0"/>
               </a:ext>
             </a:extLst>
           </a:blip>
@@ -7763,7 +7818,7 @@
     </p:spTree>
     <p:extLst>
       <p:ext uri="{BB962C8B-B14F-4D97-AF65-F5344CB8AC3E}">
-        <p14:creationId xmlns:p14="http://schemas.microsoft.com/office/powerpoint/2010/main" val="256488427"/>
+        <p14:creationId xmlns:p14="http://schemas.microsoft.com/office/powerpoint/2010/main" xmlns="" val="256488427"/>
       </p:ext>
     </p:extLst>
   </p:cSld>
@@ -7882,6 +7937,7 @@
           <a:p>
             <a:fld id="{4DBC7FC8-25FB-FC45-8177-2B991DA6778C}" type="slidenum">
               <a:rPr lang="en-US" smtClean="0"/>
+              <a:pPr/>
               <a:t>10</a:t>
             </a:fld>
             <a:endParaRPr lang="en-US"/>
@@ -7924,7 +7980,7 @@
           <a:blip r:embed="rId4">
             <a:extLst>
               <a:ext uri="{28A0092B-C50C-407E-A947-70E740481C1C}">
-                <a14:useLocalDpi xmlns:a14="http://schemas.microsoft.com/office/drawing/2010/main"/>
+                <a14:useLocalDpi xmlns:a14="http://schemas.microsoft.com/office/drawing/2010/main" xmlns=""/>
               </a:ext>
             </a:extLst>
           </a:blip>
@@ -7954,7 +8010,7 @@
           <a:blip r:embed="rId5">
             <a:extLst>
               <a:ext uri="{28A0092B-C50C-407E-A947-70E740481C1C}">
-                <a14:useLocalDpi xmlns:a14="http://schemas.microsoft.com/office/drawing/2010/main"/>
+                <a14:useLocalDpi xmlns:a14="http://schemas.microsoft.com/office/drawing/2010/main" xmlns=""/>
               </a:ext>
             </a:extLst>
           </a:blip>
@@ -8519,7 +8575,7 @@
     </p:spTree>
     <p:extLst>
       <p:ext uri="{BB962C8B-B14F-4D97-AF65-F5344CB8AC3E}">
-        <p14:creationId xmlns:p14="http://schemas.microsoft.com/office/powerpoint/2010/main" val="2752148859"/>
+        <p14:creationId xmlns:p14="http://schemas.microsoft.com/office/powerpoint/2010/main" xmlns="" val="2752148859"/>
       </p:ext>
     </p:extLst>
   </p:cSld>
@@ -8616,6 +8672,7 @@
           <a:p>
             <a:fld id="{4DBC7FC8-25FB-FC45-8177-2B991DA6778C}" type="slidenum">
               <a:rPr lang="en-US" smtClean="0"/>
+              <a:pPr/>
               <a:t>11</a:t>
             </a:fld>
             <a:endParaRPr lang="en-US"/>
@@ -8634,7 +8691,7 @@
           <a:blip r:embed="rId2">
             <a:extLst>
               <a:ext uri="{28A0092B-C50C-407E-A947-70E740481C1C}">
-                <a14:useLocalDpi xmlns:a14="http://schemas.microsoft.com/office/drawing/2010/main"/>
+                <a14:useLocalDpi xmlns:a14="http://schemas.microsoft.com/office/drawing/2010/main" xmlns=""/>
               </a:ext>
             </a:extLst>
           </a:blip>
@@ -8652,10 +8709,66 @@
           </a:prstGeom>
         </p:spPr>
       </p:pic>
+      <p:sp>
+        <p:nvSpPr>
+          <p:cNvPr id="7" name="Content Placeholder 2"/>
+          <p:cNvSpPr>
+            <a:spLocks noGrp="1"/>
+          </p:cNvSpPr>
+          <p:nvPr>
+            <p:ph idx="1"/>
+          </p:nvPr>
+        </p:nvSpPr>
+        <p:spPr>
+          <a:xfrm>
+            <a:off x="457200" y="4969482"/>
+            <a:ext cx="8245474" cy="1156681"/>
+          </a:xfrm>
+        </p:spPr>
+        <p:txBody>
+          <a:bodyPr>
+            <a:normAutofit/>
+          </a:bodyPr>
+          <a:lstStyle/>
+          <a:p>
+            <a:r>
+              <a:rPr lang="en-GB" dirty="0" smtClean="0">
+                <a:solidFill>
+                  <a:srgbClr val="FF0000"/>
+                </a:solidFill>
+              </a:rPr>
+              <a:t>Remember to Save your EV3 program using</a:t>
+            </a:r>
+          </a:p>
+          <a:p>
+            <a:r>
+              <a:rPr lang="en-GB" dirty="0" smtClean="0">
+                <a:solidFill>
+                  <a:srgbClr val="FF0000"/>
+                </a:solidFill>
+              </a:rPr>
+              <a:t>	</a:t>
+            </a:r>
+            <a:r>
+              <a:rPr lang="en-GB" dirty="0" smtClean="0">
+                <a:solidFill>
+                  <a:srgbClr val="FF0000"/>
+                </a:solidFill>
+              </a:rPr>
+              <a:t>File &gt; Save Project As</a:t>
+            </a:r>
+            <a:endParaRPr lang="en-US" dirty="0" smtClean="0">
+              <a:solidFill>
+                <a:srgbClr val="FF0000"/>
+              </a:solidFill>
+            </a:endParaRPr>
+          </a:p>
+        </p:txBody>
+      </p:sp>
     </p:spTree>
     <p:extLst>
       <p:ext uri="{BB962C8B-B14F-4D97-AF65-F5344CB8AC3E}">
-        <p14:creationId xmlns:p14="http://schemas.microsoft.com/office/powerpoint/2010/main" val="19183917"/>
+        <p14:creationId xmlns:p14="http://schemas.microsoft.com/office/powerpoint/2010/main" xmlns="" val="19183917"/>
       </p:ext>
     </p:extLst>
   </p:cSld>
@@ -8919,6 +9032,7 @@
           <a:p>
             <a:fld id="{4DBC7FC8-25FB-FC45-8177-2B991DA6778C}" type="slidenum">
               <a:rPr lang="en-US" smtClean="0"/>
+              <a:pPr/>
               <a:t>12</a:t>
             </a:fld>
             <a:endParaRPr lang="en-US"/>
@@ -8928,7 +9042,7 @@
     </p:spTree>
     <p:extLst>
       <p:ext uri="{BB962C8B-B14F-4D97-AF65-F5344CB8AC3E}">
-        <p14:creationId xmlns:p14="http://schemas.microsoft.com/office/powerpoint/2010/main" val="314321831"/>
+        <p14:creationId xmlns:p14="http://schemas.microsoft.com/office/powerpoint/2010/main" xmlns="" val="314321831"/>
       </p:ext>
     </p:extLst>
   </p:cSld>
@@ -9308,6 +9422,7 @@
           <a:p>
             <a:fld id="{4DBC7FC8-25FB-FC45-8177-2B991DA6778C}" type="slidenum">
               <a:rPr lang="en-US" smtClean="0"/>
+              <a:pPr/>
               <a:t>13</a:t>
             </a:fld>
             <a:endParaRPr lang="en-US"/>
@@ -9339,7 +9454,7 @@
           <a:effectLst/>
           <a:extLst>
             <a:ext uri="{91240B29-F687-4f45-9708-019B960494DF}">
-              <a14:hiddenLine xmlns:a14="http://schemas.microsoft.com/office/drawing/2010/main" xmlns="" w="9525">
+              <a14:hiddenLine xmlns="" xmlns:a14="http://schemas.microsoft.com/office/drawing/2010/main" w="9525">
                 <a:solidFill>
                   <a:schemeClr val="tx1"/>
                 </a:solidFill>
@@ -9349,7 +9464,7 @@
               </a14:hiddenLine>
             </a:ext>
             <a:ext uri="{AF507438-7753-43e0-B8FC-AC1667EBCBE1}">
-              <a14:hiddenEffects xmlns:a14="http://schemas.microsoft.com/office/drawing/2010/main" xmlns="">
+              <a14:hiddenEffects xmlns="" xmlns:a14="http://schemas.microsoft.com/office/drawing/2010/main">
                 <a:effectLst>
                   <a:outerShdw dist="35921" dir="2700000" algn="ctr" rotWithShape="0">
                     <a:schemeClr val="bg2"/>
@@ -9682,7 +9797,7 @@
           <a:blip r:embed="rId3">
             <a:extLst>
               <a:ext uri="{28A0092B-C50C-407E-A947-70E740481C1C}">
-                <a14:useLocalDpi xmlns:a14="http://schemas.microsoft.com/office/drawing/2010/main"/>
+                <a14:useLocalDpi xmlns:a14="http://schemas.microsoft.com/office/drawing/2010/main" xmlns=""/>
               </a:ext>
             </a:extLst>
           </a:blip>
@@ -9702,7 +9817,7 @@
           <a:noFill/>
           <a:extLst>
             <a:ext uri="{909E8E84-426E-40dd-AFC4-6F175D3DCCD1}">
-              <a14:hiddenFill xmlns:a14="http://schemas.microsoft.com/office/drawing/2010/main" xmlns="">
+              <a14:hiddenFill xmlns="" xmlns:a14="http://schemas.microsoft.com/office/drawing/2010/main">
                 <a:solidFill>
                   <a:srgbClr val="FFFFFF"/>
                 </a:solidFill>
@@ -9714,7 +9829,7 @@
     </p:spTree>
     <p:extLst>
       <p:ext uri="{BB962C8B-B14F-4D97-AF65-F5344CB8AC3E}">
-        <p14:creationId xmlns:p14="http://schemas.microsoft.com/office/powerpoint/2010/main" val="280975033"/>
+        <p14:creationId xmlns:p14="http://schemas.microsoft.com/office/powerpoint/2010/main" xmlns="" val="280975033"/>
       </p:ext>
     </p:extLst>
   </p:cSld>
@@ -9875,6 +9990,7 @@
           <a:p>
             <a:fld id="{4DBC7FC8-25FB-FC45-8177-2B991DA6778C}" type="slidenum">
               <a:rPr lang="en-US" smtClean="0"/>
+              <a:pPr/>
               <a:t>2</a:t>
             </a:fld>
             <a:endParaRPr lang="en-US"/>
@@ -9884,7 +10000,7 @@
     </p:spTree>
     <p:extLst>
       <p:ext uri="{BB962C8B-B14F-4D97-AF65-F5344CB8AC3E}">
-        <p14:creationId xmlns:p14="http://schemas.microsoft.com/office/powerpoint/2010/main" val="1867322734"/>
+        <p14:creationId xmlns:p14="http://schemas.microsoft.com/office/powerpoint/2010/main" xmlns="" val="1867322734"/>
       </p:ext>
     </p:extLst>
   </p:cSld>
@@ -10073,7 +10189,7 @@
           <a:blip r:embed="rId3">
             <a:extLst>
               <a:ext uri="{28A0092B-C50C-407E-A947-70E740481C1C}">
-                <a14:useLocalDpi xmlns:a14="http://schemas.microsoft.com/office/drawing/2010/main"/>
+                <a14:useLocalDpi xmlns:a14="http://schemas.microsoft.com/office/drawing/2010/main" xmlns=""/>
               </a:ext>
             </a:extLst>
           </a:blip>
@@ -10093,7 +10209,7 @@
           <a:noFill/>
           <a:extLst>
             <a:ext uri="{909E8E84-426E-40dd-AFC4-6F175D3DCCD1}">
-              <a14:hiddenFill xmlns:a14="http://schemas.microsoft.com/office/drawing/2010/main" xmlns="">
+              <a14:hiddenFill xmlns="" xmlns:a14="http://schemas.microsoft.com/office/drawing/2010/main">
                 <a:solidFill>
                   <a:srgbClr val="FFFFFF"/>
                 </a:solidFill>
@@ -10160,7 +10276,7 @@
           <a:blip r:embed="rId5" cstate="print">
             <a:extLst>
               <a:ext uri="{28A0092B-C50C-407E-A947-70E740481C1C}">
-                <a14:useLocalDpi xmlns:a14="http://schemas.microsoft.com/office/drawing/2010/main"/>
+                <a14:useLocalDpi xmlns:a14="http://schemas.microsoft.com/office/drawing/2010/main" xmlns=""/>
               </a:ext>
             </a:extLst>
           </a:blip>
@@ -10210,7 +10326,7 @@
     </p:spTree>
     <p:extLst>
       <p:ext uri="{BB962C8B-B14F-4D97-AF65-F5344CB8AC3E}">
-        <p14:creationId xmlns:p14="http://schemas.microsoft.com/office/powerpoint/2010/main" val="3561418941"/>
+        <p14:creationId xmlns:p14="http://schemas.microsoft.com/office/powerpoint/2010/main" xmlns="" val="3561418941"/>
       </p:ext>
     </p:extLst>
   </p:cSld>
@@ -10414,6 +10530,7 @@
           <a:p>
             <a:fld id="{4DBC7FC8-25FB-FC45-8177-2B991DA6778C}" type="slidenum">
               <a:rPr lang="en-US" smtClean="0"/>
+              <a:pPr/>
               <a:t>4</a:t>
             </a:fld>
             <a:endParaRPr lang="en-US"/>
@@ -10432,7 +10549,7 @@
           <a:blip r:embed="rId2" cstate="print">
             <a:extLst>
               <a:ext uri="{28A0092B-C50C-407E-A947-70E740481C1C}">
-                <a14:useLocalDpi xmlns:a14="http://schemas.microsoft.com/office/drawing/2010/main"/>
+                <a14:useLocalDpi xmlns:a14="http://schemas.microsoft.com/office/drawing/2010/main" xmlns=""/>
               </a:ext>
             </a:extLst>
           </a:blip>
@@ -10452,7 +10569,7 @@
     </p:spTree>
     <p:extLst>
       <p:ext uri="{BB962C8B-B14F-4D97-AF65-F5344CB8AC3E}">
-        <p14:creationId xmlns:p14="http://schemas.microsoft.com/office/powerpoint/2010/main" val="522414363"/>
+        <p14:creationId xmlns:p14="http://schemas.microsoft.com/office/powerpoint/2010/main" xmlns="" val="522414363"/>
       </p:ext>
     </p:extLst>
   </p:cSld>
@@ -10524,7 +10641,7 @@
             <p:ph idx="1"/>
             <p:extLst>
               <p:ext uri="{D42A27DB-BD31-4B8C-83A1-F6EECF244321}">
-                <p14:modId xmlns:p14="http://schemas.microsoft.com/office/powerpoint/2010/main" val="3428856351"/>
+                <p14:modId xmlns:p14="http://schemas.microsoft.com/office/powerpoint/2010/main" xmlns="" val="3428856351"/>
               </p:ext>
             </p:extLst>
           </p:nvPr>
@@ -10543,35 +10660,35 @@
                 <a:gridCol w="820884">
                   <a:extLst>
                     <a:ext uri="{9D8B030D-6E8A-4147-A177-3AD203B41FA5}">
-                      <a16:colId xmlns:a16="http://schemas.microsoft.com/office/drawing/2014/main" val="20000"/>
+                      <a16:colId xmlns:a16="http://schemas.microsoft.com/office/drawing/2014/main" xmlns="" val="20000"/>
                     </a:ext>
                   </a:extLst>
                 </a:gridCol>
                 <a:gridCol w="3934964">
                   <a:extLst>
                     <a:ext uri="{9D8B030D-6E8A-4147-A177-3AD203B41FA5}">
-                      <a16:colId xmlns:a16="http://schemas.microsoft.com/office/drawing/2014/main" val="20001"/>
+                      <a16:colId xmlns:a16="http://schemas.microsoft.com/office/drawing/2014/main" xmlns="" val="20001"/>
                     </a:ext>
                   </a:extLst>
                 </a:gridCol>
                 <a:gridCol w="1112762">
                   <a:extLst>
                     <a:ext uri="{9D8B030D-6E8A-4147-A177-3AD203B41FA5}">
-                      <a16:colId xmlns:a16="http://schemas.microsoft.com/office/drawing/2014/main" val="20002"/>
+                      <a16:colId xmlns:a16="http://schemas.microsoft.com/office/drawing/2014/main" xmlns="" val="20002"/>
                     </a:ext>
                   </a:extLst>
                 </a:gridCol>
                 <a:gridCol w="1064380">
                   <a:extLst>
                     <a:ext uri="{9D8B030D-6E8A-4147-A177-3AD203B41FA5}">
-                      <a16:colId xmlns:a16="http://schemas.microsoft.com/office/drawing/2014/main" val="20003"/>
+                      <a16:colId xmlns:a16="http://schemas.microsoft.com/office/drawing/2014/main" xmlns="" val="20003"/>
                     </a:ext>
                   </a:extLst>
                 </a:gridCol>
                 <a:gridCol w="1025046">
                   <a:extLst>
                     <a:ext uri="{9D8B030D-6E8A-4147-A177-3AD203B41FA5}">
-                      <a16:colId xmlns:a16="http://schemas.microsoft.com/office/drawing/2014/main" val="20004"/>
+                      <a16:colId xmlns:a16="http://schemas.microsoft.com/office/drawing/2014/main" xmlns="" val="20004"/>
                     </a:ext>
                   </a:extLst>
                 </a:gridCol>
@@ -10662,7 +10779,7 @@
                 </a:tc>
                 <a:extLst>
                   <a:ext uri="{0D108BD9-81ED-4DB2-BD59-A6C34878D82A}">
-                    <a16:rowId xmlns:a16="http://schemas.microsoft.com/office/drawing/2014/main" val="10000"/>
+                    <a16:rowId xmlns:a16="http://schemas.microsoft.com/office/drawing/2014/main" xmlns="" val="10000"/>
                   </a:ext>
                 </a:extLst>
               </a:tr>
@@ -10749,7 +10866,7 @@
                 </a:tc>
                 <a:extLst>
                   <a:ext uri="{0D108BD9-81ED-4DB2-BD59-A6C34878D82A}">
-                    <a16:rowId xmlns:a16="http://schemas.microsoft.com/office/drawing/2014/main" val="10001"/>
+                    <a16:rowId xmlns:a16="http://schemas.microsoft.com/office/drawing/2014/main" xmlns="" val="10001"/>
                   </a:ext>
                 </a:extLst>
               </a:tr>
@@ -10836,7 +10953,7 @@
                 </a:tc>
                 <a:extLst>
                   <a:ext uri="{0D108BD9-81ED-4DB2-BD59-A6C34878D82A}">
-                    <a16:rowId xmlns:a16="http://schemas.microsoft.com/office/drawing/2014/main" val="10002"/>
+                    <a16:rowId xmlns:a16="http://schemas.microsoft.com/office/drawing/2014/main" xmlns="" val="10002"/>
                   </a:ext>
                 </a:extLst>
               </a:tr>
@@ -10935,7 +11052,7 @@
                 </a:tc>
                 <a:extLst>
                   <a:ext uri="{0D108BD9-81ED-4DB2-BD59-A6C34878D82A}">
-                    <a16:rowId xmlns:a16="http://schemas.microsoft.com/office/drawing/2014/main" val="10003"/>
+                    <a16:rowId xmlns:a16="http://schemas.microsoft.com/office/drawing/2014/main" xmlns="" val="10003"/>
                   </a:ext>
                 </a:extLst>
               </a:tr>
@@ -11026,7 +11143,7 @@
                 </a:tc>
                 <a:extLst>
                   <a:ext uri="{0D108BD9-81ED-4DB2-BD59-A6C34878D82A}">
-                    <a16:rowId xmlns:a16="http://schemas.microsoft.com/office/drawing/2014/main" val="10004"/>
+                    <a16:rowId xmlns:a16="http://schemas.microsoft.com/office/drawing/2014/main" xmlns="" val="10004"/>
                   </a:ext>
                 </a:extLst>
               </a:tr>
@@ -11142,7 +11259,7 @@
                 </a:tc>
                 <a:extLst>
                   <a:ext uri="{0D108BD9-81ED-4DB2-BD59-A6C34878D82A}">
-                    <a16:rowId xmlns:a16="http://schemas.microsoft.com/office/drawing/2014/main" val="10005"/>
+                    <a16:rowId xmlns:a16="http://schemas.microsoft.com/office/drawing/2014/main" xmlns="" val="10005"/>
                   </a:ext>
                 </a:extLst>
               </a:tr>
@@ -11218,7 +11335,7 @@
                 </a:tc>
                 <a:extLst>
                   <a:ext uri="{0D108BD9-81ED-4DB2-BD59-A6C34878D82A}">
-                    <a16:rowId xmlns:a16="http://schemas.microsoft.com/office/drawing/2014/main" val="10006"/>
+                    <a16:rowId xmlns:a16="http://schemas.microsoft.com/office/drawing/2014/main" xmlns="" val="10006"/>
                   </a:ext>
                 </a:extLst>
               </a:tr>
@@ -11332,7 +11449,7 @@
                 </a:tc>
                 <a:extLst>
                   <a:ext uri="{0D108BD9-81ED-4DB2-BD59-A6C34878D82A}">
-                    <a16:rowId xmlns:a16="http://schemas.microsoft.com/office/drawing/2014/main" val="10007"/>
+                    <a16:rowId xmlns:a16="http://schemas.microsoft.com/office/drawing/2014/main" xmlns="" val="10007"/>
                   </a:ext>
                 </a:extLst>
               </a:tr>
@@ -11422,7 +11539,7 @@
                 </a:tc>
                 <a:extLst>
                   <a:ext uri="{0D108BD9-81ED-4DB2-BD59-A6C34878D82A}">
-                    <a16:rowId xmlns:a16="http://schemas.microsoft.com/office/drawing/2014/main" val="10008"/>
+                    <a16:rowId xmlns:a16="http://schemas.microsoft.com/office/drawing/2014/main" xmlns="" val="10008"/>
                   </a:ext>
                 </a:extLst>
               </a:tr>
@@ -11470,6 +11587,7 @@
           <a:p>
             <a:fld id="{4DBC7FC8-25FB-FC45-8177-2B991DA6778C}" type="slidenum">
               <a:rPr lang="en-US" smtClean="0"/>
+              <a:pPr/>
               <a:t>5</a:t>
             </a:fld>
             <a:endParaRPr lang="en-US"/>
@@ -11544,7 +11662,7 @@
     </p:spTree>
     <p:extLst>
       <p:ext uri="{BB962C8B-B14F-4D97-AF65-F5344CB8AC3E}">
-        <p14:creationId xmlns:p14="http://schemas.microsoft.com/office/powerpoint/2010/main" val="2634222287"/>
+        <p14:creationId xmlns:p14="http://schemas.microsoft.com/office/powerpoint/2010/main" xmlns="" val="2634222287"/>
       </p:ext>
     </p:extLst>
   </p:cSld>
@@ -11691,6 +11809,7 @@
           <a:p>
             <a:fld id="{4DBC7FC8-25FB-FC45-8177-2B991DA6778C}" type="slidenum">
               <a:rPr lang="en-US" smtClean="0"/>
+              <a:pPr/>
               <a:t>6</a:t>
             </a:fld>
             <a:endParaRPr lang="en-US"/>
@@ -11709,7 +11828,7 @@
           <a:blip r:embed="rId2">
             <a:extLst>
               <a:ext uri="{28A0092B-C50C-407E-A947-70E740481C1C}">
-                <a14:useLocalDpi xmlns:a14="http://schemas.microsoft.com/office/drawing/2010/main"/>
+                <a14:useLocalDpi xmlns:a14="http://schemas.microsoft.com/office/drawing/2010/main" xmlns=""/>
               </a:ext>
             </a:extLst>
           </a:blip>
@@ -11739,7 +11858,7 @@
           <a:blip r:embed="rId3">
             <a:extLst>
               <a:ext uri="{28A0092B-C50C-407E-A947-70E740481C1C}">
-                <a14:useLocalDpi xmlns:a14="http://schemas.microsoft.com/office/drawing/2010/main"/>
+                <a14:useLocalDpi xmlns:a14="http://schemas.microsoft.com/office/drawing/2010/main" xmlns=""/>
               </a:ext>
             </a:extLst>
           </a:blip>
@@ -12025,7 +12144,7 @@
           <a:blip r:embed="rId4" cstate="print">
             <a:extLst>
               <a:ext uri="{28A0092B-C50C-407E-A947-70E740481C1C}">
-                <a14:useLocalDpi xmlns:a14="http://schemas.microsoft.com/office/drawing/2010/main"/>
+                <a14:useLocalDpi xmlns:a14="http://schemas.microsoft.com/office/drawing/2010/main" xmlns=""/>
               </a:ext>
             </a:extLst>
           </a:blip>
@@ -12148,7 +12267,7 @@
     </p:spTree>
     <p:extLst>
       <p:ext uri="{BB962C8B-B14F-4D97-AF65-F5344CB8AC3E}">
-        <p14:creationId xmlns:p14="http://schemas.microsoft.com/office/powerpoint/2010/main" val="1864472416"/>
+        <p14:creationId xmlns:p14="http://schemas.microsoft.com/office/powerpoint/2010/main" xmlns="" val="1864472416"/>
       </p:ext>
     </p:extLst>
   </p:cSld>
@@ -12245,6 +12364,7 @@
           <a:p>
             <a:fld id="{4DBC7FC8-25FB-FC45-8177-2B991DA6778C}" type="slidenum">
               <a:rPr lang="en-US" smtClean="0"/>
+              <a:pPr/>
               <a:t>7</a:t>
             </a:fld>
             <a:endParaRPr lang="en-US"/>
@@ -12546,7 +12666,7 @@
           <a:blip r:embed="rId2">
             <a:extLst>
               <a:ext uri="{28A0092B-C50C-407E-A947-70E740481C1C}">
-                <a14:useLocalDpi xmlns:a14="http://schemas.microsoft.com/office/drawing/2010/main"/>
+                <a14:useLocalDpi xmlns:a14="http://schemas.microsoft.com/office/drawing/2010/main" xmlns=""/>
               </a:ext>
             </a:extLst>
           </a:blip>
@@ -12611,7 +12731,7 @@
     </p:spTree>
     <p:extLst>
       <p:ext uri="{BB962C8B-B14F-4D97-AF65-F5344CB8AC3E}">
-        <p14:creationId xmlns:p14="http://schemas.microsoft.com/office/powerpoint/2010/main" val="1071746091"/>
+        <p14:creationId xmlns:p14="http://schemas.microsoft.com/office/powerpoint/2010/main" xmlns="" val="1071746091"/>
       </p:ext>
     </p:extLst>
   </p:cSld>
@@ -12738,6 +12858,7 @@
           <a:p>
             <a:fld id="{4DBC7FC8-25FB-FC45-8177-2B991DA6778C}" type="slidenum">
               <a:rPr lang="en-US" smtClean="0"/>
+              <a:pPr/>
               <a:t>8</a:t>
             </a:fld>
             <a:endParaRPr lang="en-US"/>
@@ -12780,7 +12901,7 @@
           <a:blip r:embed="rId3">
             <a:extLst>
               <a:ext uri="{28A0092B-C50C-407E-A947-70E740481C1C}">
-                <a14:useLocalDpi xmlns:a14="http://schemas.microsoft.com/office/drawing/2010/main"/>
+                <a14:useLocalDpi xmlns:a14="http://schemas.microsoft.com/office/drawing/2010/main" xmlns=""/>
               </a:ext>
             </a:extLst>
           </a:blip>
@@ -12810,7 +12931,7 @@
           <a:blip r:embed="rId4">
             <a:extLst>
               <a:ext uri="{28A0092B-C50C-407E-A947-70E740481C1C}">
-                <a14:useLocalDpi xmlns:a14="http://schemas.microsoft.com/office/drawing/2010/main"/>
+                <a14:useLocalDpi xmlns:a14="http://schemas.microsoft.com/office/drawing/2010/main" xmlns=""/>
               </a:ext>
             </a:extLst>
           </a:blip>
@@ -13276,7 +13397,7 @@
           <a:blip r:embed="rId5" cstate="print">
             <a:extLst>
               <a:ext uri="{28A0092B-C50C-407E-A947-70E740481C1C}">
-                <a14:useLocalDpi xmlns:a14="http://schemas.microsoft.com/office/drawing/2010/main"/>
+                <a14:useLocalDpi xmlns:a14="http://schemas.microsoft.com/office/drawing/2010/main" xmlns=""/>
               </a:ext>
             </a:extLst>
           </a:blip>
@@ -13296,7 +13417,7 @@
           <a:noFill/>
           <a:extLst>
             <a:ext uri="{909E8E84-426E-40dd-AFC4-6F175D3DCCD1}">
-              <a14:hiddenFill xmlns:a14="http://schemas.microsoft.com/office/drawing/2010/main" xmlns="">
+              <a14:hiddenFill xmlns="" xmlns:a14="http://schemas.microsoft.com/office/drawing/2010/main">
                 <a:solidFill>
                   <a:srgbClr val="FFFFFF"/>
                 </a:solidFill>
@@ -13308,7 +13429,7 @@
     </p:spTree>
     <p:extLst>
       <p:ext uri="{BB962C8B-B14F-4D97-AF65-F5344CB8AC3E}">
-        <p14:creationId xmlns:p14="http://schemas.microsoft.com/office/powerpoint/2010/main" val="3073513229"/>
+        <p14:creationId xmlns:p14="http://schemas.microsoft.com/office/powerpoint/2010/main" xmlns="" val="3073513229"/>
       </p:ext>
     </p:extLst>
   </p:cSld>
@@ -13428,6 +13549,7 @@
           <a:p>
             <a:fld id="{4DBC7FC8-25FB-FC45-8177-2B991DA6778C}" type="slidenum">
               <a:rPr lang="en-US" smtClean="0"/>
+              <a:pPr/>
               <a:t>9</a:t>
             </a:fld>
             <a:endParaRPr lang="en-US"/>
@@ -13461,7 +13583,7 @@
     </p:spTree>
     <p:extLst>
       <p:ext uri="{BB962C8B-B14F-4D97-AF65-F5344CB8AC3E}">
-        <p14:creationId xmlns:p14="http://schemas.microsoft.com/office/powerpoint/2010/main" val="774892794"/>
+        <p14:creationId xmlns:p14="http://schemas.microsoft.com/office/powerpoint/2010/main" xmlns="" val="774892794"/>
       </p:ext>
     </p:extLst>
   </p:cSld>
@@ -13723,7 +13845,7 @@
   <a:extraClrSchemeLst/>
   <a:extLst>
     <a:ext uri="{05A4C25C-085E-4340-85A3-A5531E510DB2}">
-      <thm15:themeFamily xmlns:thm15="http://schemas.microsoft.com/office/thememl/2012/main" name="beginner" id="{AEF29D72-34CC-C448-A679-08550D2D21D1}" vid="{04B54D62-7BE5-DF47-9F85-5B9FEF4E3E09}"/>
+      <thm15:themeFamily xmlns:thm15="http://schemas.microsoft.com/office/thememl/2012/main" xmlns="" name="beginner" id="{AEF29D72-34CC-C448-A679-08550D2D21D1}" vid="{04B54D62-7BE5-DF47-9F85-5B9FEF4E3E09}"/>
     </a:ext>
   </a:extLst>
 </a:theme>
@@ -13984,7 +14106,7 @@
   <a:extraClrSchemeLst/>
   <a:extLst>
     <a:ext uri="{05A4C25C-085E-4340-85A3-A5531E510DB2}">
-      <thm15:themeFamily xmlns:thm15="http://schemas.microsoft.com/office/thememl/2012/main" name="Office Theme" id="{62F939B6-93AF-4DB8-9C6B-D6C7DFDC589F}" vid="{4A3C46E8-61CC-4603-A589-7422A47A8E4A}"/>
+      <thm15:themeFamily xmlns:thm15="http://schemas.microsoft.com/office/thememl/2012/main" xmlns="" name="Office Theme" id="{62F939B6-93AF-4DB8-9C6B-D6C7DFDC589F}" vid="{4A3C46E8-61CC-4603-A589-7422A47A8E4A}"/>
     </a:ext>
   </a:extLst>
 </a:theme>

</xml_diff>